<commit_message>
add IoC and Composite vs Inheritance samples, update pptx
</commit_message>
<xml_diff>
--- a/OOP_Brett.pptx
+++ b/OOP_Brett.pptx
@@ -5,10 +5,10 @@
     <p:sldMasterId id="2147483691" r:id="rId1"/>
   </p:sldMasterIdLst>
   <p:notesMasterIdLst>
-    <p:notesMasterId r:id="rId21"/>
+    <p:notesMasterId r:id="rId22"/>
   </p:notesMasterIdLst>
   <p:handoutMasterIdLst>
-    <p:handoutMasterId r:id="rId22"/>
+    <p:handoutMasterId r:id="rId23"/>
   </p:handoutMasterIdLst>
   <p:sldIdLst>
     <p:sldId id="256" r:id="rId2"/>
@@ -28,8 +28,9 @@
     <p:sldId id="289" r:id="rId16"/>
     <p:sldId id="275" r:id="rId17"/>
     <p:sldId id="276" r:id="rId18"/>
-    <p:sldId id="277" r:id="rId19"/>
-    <p:sldId id="273" r:id="rId20"/>
+    <p:sldId id="290" r:id="rId19"/>
+    <p:sldId id="277" r:id="rId20"/>
+    <p:sldId id="273" r:id="rId21"/>
   </p:sldIdLst>
   <p:sldSz cx="9144000" cy="6858000" type="screen4x3"/>
   <p:notesSz cx="7019925" cy="9305925"/>
@@ -884,7 +885,7 @@
             <a:fld id="{7CDDE2AD-658D-4E11-AFAA-8DDC7E0546E0}" type="slidenum">
               <a:rPr lang="en-SG" smtClean="0"/>
               <a:pPr/>
-              <a:t>18</a:t>
+              <a:t>19</a:t>
             </a:fld>
             <a:endParaRPr lang="en-SG"/>
           </a:p>
@@ -966,7 +967,7 @@
             <a:fld id="{7CDDE2AD-658D-4E11-AFAA-8DDC7E0546E0}" type="slidenum">
               <a:rPr lang="en-SG" smtClean="0"/>
               <a:pPr/>
-              <a:t>19</a:t>
+              <a:t>20</a:t>
             </a:fld>
             <a:endParaRPr lang="en-SG"/>
           </a:p>
@@ -3928,6 +3929,10 @@
               <a:rPr lang="en-US" altLang="zh-TW" dirty="0" err="1" smtClean="0"/>
               <a:t>IoC</a:t>
             </a:r>
+            <a:r>
+              <a:rPr lang="en-US" altLang="zh-TW" dirty="0"/>
+              <a:t> - Inversion of Control</a:t>
+            </a:r>
             <a:endParaRPr lang="zh-TW" altLang="en-US" dirty="0"/>
           </a:p>
         </p:txBody>
@@ -3948,8 +3953,12 @@
           <a:lstStyle/>
           <a:p>
             <a:r>
-              <a:rPr lang="en-US" altLang="zh-TW" u="sng" dirty="0" smtClean="0"/>
-              <a:t>Dependency Injection</a:t>
+              <a:rPr lang="en-US" altLang="zh-TW" dirty="0" smtClean="0"/>
+              <a:t>Dependency </a:t>
+            </a:r>
+            <a:r>
+              <a:rPr lang="en-US" altLang="zh-TW" dirty="0" smtClean="0"/>
+              <a:t>Injection</a:t>
             </a:r>
           </a:p>
           <a:p>
@@ -3967,38 +3976,36 @@
             </a:r>
           </a:p>
           <a:p>
-            <a:r>
-              <a:rPr lang="en-US" altLang="zh-TW" u="sng" dirty="0" smtClean="0"/>
-              <a:t>Dependency Lookup</a:t>
-            </a:r>
-          </a:p>
-          <a:p>
-            <a:r>
-              <a:rPr lang="en-US" altLang="zh-TW" dirty="0" smtClean="0"/>
-              <a:t>Pros and Cons</a:t>
-            </a:r>
-          </a:p>
-          <a:p>
             <a:pPr lvl="1"/>
-            <a:r>
-              <a:rPr lang="en-US" altLang="zh-TW" dirty="0" smtClean="0"/>
-              <a:t>Passive and Active</a:t>
+            <a:endParaRPr lang="en-US" altLang="zh-TW" dirty="0" smtClean="0"/>
+          </a:p>
+          <a:p>
+            <a:r>
+              <a:rPr lang="en-US" altLang="zh-TW" dirty="0" smtClean="0"/>
+              <a:t>Pros </a:t>
+            </a:r>
+            <a:r>
+              <a:rPr lang="en-US" altLang="zh-TW" dirty="0" smtClean="0"/>
+              <a:t>and Cons</a:t>
             </a:r>
           </a:p>
           <a:p>
             <a:pPr lvl="1"/>
             <a:r>
-              <a:rPr lang="en-US" altLang="zh-TW" dirty="0" smtClean="0"/>
-              <a:t>Operating the object</a:t>
+              <a:rPr lang="en-US" altLang="zh-TW" dirty="0"/>
+              <a:t>How to ensure dependencies were injected?</a:t>
             </a:r>
           </a:p>
           <a:p>
             <a:pPr lvl="1"/>
             <a:r>
               <a:rPr lang="en-US" altLang="zh-TW" dirty="0" smtClean="0"/>
-              <a:t>Unit Testing</a:t>
-            </a:r>
-            <a:endParaRPr lang="zh-TW" altLang="en-US" dirty="0"/>
+              <a:t>How many dependencies need to inject?</a:t>
+            </a:r>
+          </a:p>
+          <a:p>
+            <a:pPr lvl="1"/>
+            <a:endParaRPr lang="en-US" altLang="zh-TW" dirty="0" smtClean="0"/>
           </a:p>
         </p:txBody>
       </p:sp>
@@ -4012,6 +4019,13 @@
   <p:clrMapOvr>
     <a:masterClrMapping/>
   </p:clrMapOvr>
+  <p:timing>
+    <p:tnLst>
+      <p:par>
+        <p:cTn id="1" dur="indefinite" restart="never" nodeType="tmRoot"/>
+      </p:par>
+    </p:tnLst>
+  </p:timing>
 </p:sld>
 </file>
 
@@ -4076,7 +4090,7 @@
         <p:spPr/>
         <p:txBody>
           <a:bodyPr>
-            <a:normAutofit fontScale="92500" lnSpcReduction="10000"/>
+            <a:normAutofit fontScale="77500" lnSpcReduction="20000"/>
           </a:bodyPr>
           <a:lstStyle/>
           <a:p>
@@ -4089,8 +4103,23 @@
             <a:pPr lvl="1"/>
             <a:r>
               <a:rPr lang="en-US" altLang="zh-TW" dirty="0" smtClean="0"/>
-              <a:t>A has a B</a:t>
-            </a:r>
+              <a:t>A has a </a:t>
+            </a:r>
+            <a:r>
+              <a:rPr lang="en-US" altLang="zh-TW" dirty="0" smtClean="0"/>
+              <a:t>B</a:t>
+            </a:r>
+          </a:p>
+          <a:p>
+            <a:pPr lvl="1"/>
+            <a:r>
+              <a:rPr lang="en-US" altLang="zh-TW" dirty="0" smtClean="0"/>
+              <a:t>Classroom has a teacher and students</a:t>
+            </a:r>
+          </a:p>
+          <a:p>
+            <a:pPr lvl="1"/>
+            <a:endParaRPr lang="en-US" altLang="zh-TW" dirty="0" smtClean="0"/>
           </a:p>
           <a:p>
             <a:r>
@@ -4102,8 +4131,23 @@
             <a:pPr lvl="1"/>
             <a:r>
               <a:rPr lang="en-US" altLang="zh-TW" dirty="0" smtClean="0"/>
-              <a:t>A contains a B (same life circle)</a:t>
-            </a:r>
+              <a:t>A contains a B (same life circle</a:t>
+            </a:r>
+            <a:r>
+              <a:rPr lang="en-US" altLang="zh-TW" dirty="0" smtClean="0"/>
+              <a:t>)</a:t>
+            </a:r>
+          </a:p>
+          <a:p>
+            <a:pPr lvl="1"/>
+            <a:r>
+              <a:rPr lang="en-US" altLang="zh-TW" dirty="0" smtClean="0"/>
+              <a:t>Bird has two wings</a:t>
+            </a:r>
+          </a:p>
+          <a:p>
+            <a:pPr lvl="1"/>
+            <a:endParaRPr lang="en-US" altLang="zh-TW" dirty="0" smtClean="0"/>
           </a:p>
           <a:p>
             <a:r>
@@ -4116,30 +4160,24 @@
             <a:pPr lvl="1"/>
             <a:r>
               <a:rPr lang="en-US" altLang="zh-TW" dirty="0" smtClean="0"/>
-              <a:t>A is a B</a:t>
-            </a:r>
-          </a:p>
-          <a:p>
-            <a:r>
-              <a:rPr lang="en-US" altLang="zh-TW" u="sng" dirty="0"/>
-              <a:t>Pros and Cons</a:t>
-            </a:r>
-            <a:endParaRPr lang="en-US" altLang="zh-TW" u="sng" dirty="0" smtClean="0"/>
+              <a:t>A is a </a:t>
+            </a:r>
+            <a:r>
+              <a:rPr lang="en-US" altLang="zh-TW" dirty="0" smtClean="0"/>
+              <a:t>B</a:t>
+            </a:r>
           </a:p>
           <a:p>
             <a:pPr lvl="1"/>
             <a:r>
               <a:rPr lang="en-US" altLang="zh-TW" dirty="0" smtClean="0"/>
-              <a:t>Flexibility</a:t>
-            </a:r>
+              <a:t>Monkey is an animal</a:t>
+            </a:r>
+            <a:endParaRPr lang="en-US" altLang="zh-TW" dirty="0" smtClean="0"/>
           </a:p>
           <a:p>
             <a:pPr lvl="1"/>
-            <a:r>
-              <a:rPr lang="en-US" altLang="zh-TW" dirty="0" smtClean="0"/>
-              <a:t>Readability</a:t>
-            </a:r>
-            <a:endParaRPr lang="zh-TW" altLang="en-US" dirty="0"/>
+            <a:endParaRPr lang="en-US" altLang="zh-TW" dirty="0" smtClean="0"/>
           </a:p>
         </p:txBody>
       </p:sp>
@@ -4153,6 +4191,13 @@
   <p:clrMapOvr>
     <a:masterClrMapping/>
   </p:clrMapOvr>
+  <p:timing>
+    <p:tnLst>
+      <p:par>
+        <p:cTn id="1" dur="indefinite" restart="never" nodeType="tmRoot"/>
+      </p:par>
+    </p:tnLst>
+  </p:timing>
 </p:sld>
 </file>
 
@@ -4175,7 +4220,7 @@
       </p:grpSpPr>
       <p:sp>
         <p:nvSpPr>
-          <p:cNvPr id="3" name="Title 2"/>
+          <p:cNvPr id="2" name="標題 1"/>
           <p:cNvSpPr>
             <a:spLocks noGrp="1"/>
           </p:cNvSpPr>
@@ -4189,66 +4234,678 @@
           <a:lstStyle/>
           <a:p>
             <a:r>
-              <a:rPr lang="en-US" dirty="0" smtClean="0"/>
-              <a:t>Trade-Off</a:t>
-            </a:r>
-            <a:endParaRPr lang="en-SG" dirty="0"/>
-          </a:p>
-        </p:txBody>
-      </p:sp>
-      <p:sp>
-        <p:nvSpPr>
-          <p:cNvPr id="2" name="Content Placeholder 1"/>
-          <p:cNvSpPr>
-            <a:spLocks noGrp="1"/>
-          </p:cNvSpPr>
+              <a:rPr lang="en-US" altLang="zh-TW" dirty="0"/>
+              <a:t>Composite </a:t>
+            </a:r>
+            <a:r>
+              <a:rPr lang="en-US" altLang="zh-TW" dirty="0" err="1"/>
+              <a:t>vs</a:t>
+            </a:r>
+            <a:r>
+              <a:rPr lang="en-US" altLang="zh-TW" dirty="0"/>
+              <a:t> Inheritance</a:t>
+            </a:r>
+            <a:endParaRPr lang="zh-TW" altLang="en-US" dirty="0"/>
+          </a:p>
+        </p:txBody>
+      </p:sp>
+      <p:graphicFrame>
+        <p:nvGraphicFramePr>
+          <p:cNvPr id="4" name="內容版面配置區 3"/>
+          <p:cNvGraphicFramePr>
+            <a:graphicFrameLocks noGrp="1"/>
+          </p:cNvGraphicFramePr>
           <p:nvPr>
             <p:ph idx="1"/>
-          </p:nvPr>
-        </p:nvSpPr>
-        <p:spPr/>
-        <p:txBody>
-          <a:bodyPr/>
-          <a:lstStyle/>
-          <a:p>
-            <a:r>
-              <a:rPr lang="en-SG" dirty="0" smtClean="0"/>
-              <a:t>Reusability</a:t>
-            </a:r>
-            <a:endParaRPr lang="en-SG" dirty="0"/>
-          </a:p>
-          <a:p>
-            <a:r>
-              <a:rPr lang="en-SG" dirty="0" smtClean="0"/>
-              <a:t>Scalability</a:t>
-            </a:r>
-          </a:p>
-          <a:p>
-            <a:r>
-              <a:rPr lang="en-SG" dirty="0" smtClean="0"/>
-              <a:t>Readability</a:t>
-            </a:r>
-            <a:endParaRPr lang="en-SG" dirty="0"/>
-          </a:p>
-          <a:p>
-            <a:r>
-              <a:rPr lang="en-SG" dirty="0" smtClean="0"/>
-              <a:t>Testability</a:t>
-            </a:r>
-          </a:p>
-          <a:p>
-            <a:r>
-              <a:rPr lang="en-SG" altLang="zh-TW" dirty="0"/>
-              <a:t>Performance</a:t>
-            </a:r>
-            <a:endParaRPr lang="en-SG" dirty="0"/>
-          </a:p>
-        </p:txBody>
-      </p:sp>
+            <p:extLst>
+              <p:ext uri="{D42A27DB-BD31-4B8C-83A1-F6EECF244321}">
+                <p14:modId xmlns:p14="http://schemas.microsoft.com/office/powerpoint/2010/main" val="173311692"/>
+              </p:ext>
+            </p:extLst>
+          </p:nvPr>
+        </p:nvGraphicFramePr>
+        <p:xfrm>
+          <a:off x="395289" y="1557338"/>
+          <a:ext cx="7921127" cy="4984552"/>
+        </p:xfrm>
+        <a:graphic>
+          <a:graphicData uri="http://schemas.openxmlformats.org/drawingml/2006/table">
+            <a:tbl>
+              <a:tblPr firstRow="1" bandRow="1">
+                <a:tableStyleId>{5C22544A-7EE6-4342-B048-85BDC9FD1C3A}</a:tableStyleId>
+              </a:tblPr>
+              <a:tblGrid>
+                <a:gridCol w="936351"/>
+                <a:gridCol w="3384376"/>
+                <a:gridCol w="3600400"/>
+              </a:tblGrid>
+              <a:tr h="656392">
+                <a:tc>
+                  <a:txBody>
+                    <a:bodyPr/>
+                    <a:lstStyle/>
+                    <a:p>
+                      <a:endParaRPr lang="zh-TW" altLang="en-US" sz="2800" dirty="0"/>
+                    </a:p>
+                  </a:txBody>
+                  <a:tcPr/>
+                </a:tc>
+                <a:tc>
+                  <a:txBody>
+                    <a:bodyPr/>
+                    <a:lstStyle/>
+                    <a:p>
+                      <a:r>
+                        <a:rPr lang="en-US" altLang="zh-TW" sz="2800" dirty="0" smtClean="0"/>
+                        <a:t>Composite</a:t>
+                      </a:r>
+                      <a:endParaRPr lang="zh-TW" altLang="en-US" sz="2800" dirty="0"/>
+                    </a:p>
+                  </a:txBody>
+                  <a:tcPr/>
+                </a:tc>
+                <a:tc>
+                  <a:txBody>
+                    <a:bodyPr/>
+                    <a:lstStyle/>
+                    <a:p>
+                      <a:r>
+                        <a:rPr lang="en-US" altLang="zh-TW" sz="2800" dirty="0" smtClean="0"/>
+                        <a:t>Inheritance</a:t>
+                      </a:r>
+                      <a:endParaRPr lang="zh-TW" altLang="en-US" sz="2800" dirty="0"/>
+                    </a:p>
+                  </a:txBody>
+                  <a:tcPr/>
+                </a:tc>
+              </a:tr>
+              <a:tr h="1939783">
+                <a:tc>
+                  <a:txBody>
+                    <a:bodyPr/>
+                    <a:lstStyle/>
+                    <a:p>
+                      <a:r>
+                        <a:rPr lang="en-US" altLang="zh-TW" sz="2800" dirty="0" smtClean="0"/>
+                        <a:t>Pros</a:t>
+                      </a:r>
+                      <a:endParaRPr lang="zh-TW" altLang="en-US" sz="2800" dirty="0"/>
+                    </a:p>
+                  </a:txBody>
+                  <a:tcPr/>
+                </a:tc>
+                <a:tc>
+                  <a:txBody>
+                    <a:bodyPr/>
+                    <a:lstStyle/>
+                    <a:p>
+                      <a:pPr marL="457200" marR="0" indent="-457200" algn="l" defTabSz="914400" rtl="0" eaLnBrk="1" fontAlgn="auto" latinLnBrk="0" hangingPunct="1">
+                        <a:lnSpc>
+                          <a:spcPct val="100000"/>
+                        </a:lnSpc>
+                        <a:spcBef>
+                          <a:spcPts val="0"/>
+                        </a:spcBef>
+                        <a:spcAft>
+                          <a:spcPts val="0"/>
+                        </a:spcAft>
+                        <a:buClrTx/>
+                        <a:buSzTx/>
+                        <a:buFont typeface="+mj-lt"/>
+                        <a:buAutoNum type="arabicPeriod"/>
+                        <a:tabLst/>
+                        <a:defRPr/>
+                      </a:pPr>
+                      <a:r>
+                        <a:rPr lang="en-US" altLang="zh-TW" sz="1800" dirty="0" smtClean="0"/>
+                        <a:t>Keeps encapsulation</a:t>
+                      </a:r>
+                    </a:p>
+                    <a:p>
+                      <a:pPr marL="457200" marR="0" indent="-457200" algn="l" defTabSz="914400" rtl="0" eaLnBrk="1" fontAlgn="auto" latinLnBrk="0" hangingPunct="1">
+                        <a:lnSpc>
+                          <a:spcPct val="100000"/>
+                        </a:lnSpc>
+                        <a:spcBef>
+                          <a:spcPts val="0"/>
+                        </a:spcBef>
+                        <a:spcAft>
+                          <a:spcPts val="0"/>
+                        </a:spcAft>
+                        <a:buClrTx/>
+                        <a:buSzTx/>
+                        <a:buFont typeface="+mj-lt"/>
+                        <a:buAutoNum type="arabicPeriod"/>
+                        <a:tabLst/>
+                        <a:defRPr/>
+                      </a:pPr>
+                      <a:endParaRPr lang="en-US" altLang="zh-TW" sz="1800" dirty="0" smtClean="0"/>
+                    </a:p>
+                    <a:p>
+                      <a:pPr marL="457200" marR="0" indent="-457200" algn="l" defTabSz="914400" rtl="0" eaLnBrk="1" fontAlgn="auto" latinLnBrk="0" hangingPunct="1">
+                        <a:lnSpc>
+                          <a:spcPct val="100000"/>
+                        </a:lnSpc>
+                        <a:spcBef>
+                          <a:spcPts val="0"/>
+                        </a:spcBef>
+                        <a:spcAft>
+                          <a:spcPts val="0"/>
+                        </a:spcAft>
+                        <a:buClrTx/>
+                        <a:buSzTx/>
+                        <a:buFont typeface="+mj-lt"/>
+                        <a:buAutoNum type="arabicPeriod"/>
+                        <a:tabLst/>
+                        <a:defRPr/>
+                      </a:pPr>
+                      <a:r>
+                        <a:rPr lang="en-US" altLang="zh-TW" sz="1800" dirty="0" smtClean="0"/>
+                        <a:t>Low coupling</a:t>
+                      </a:r>
+                    </a:p>
+                    <a:p>
+                      <a:pPr marL="457200" marR="0" indent="-457200" algn="l" defTabSz="914400" rtl="0" eaLnBrk="1" fontAlgn="auto" latinLnBrk="0" hangingPunct="1">
+                        <a:lnSpc>
+                          <a:spcPct val="100000"/>
+                        </a:lnSpc>
+                        <a:spcBef>
+                          <a:spcPts val="0"/>
+                        </a:spcBef>
+                        <a:spcAft>
+                          <a:spcPts val="0"/>
+                        </a:spcAft>
+                        <a:buClrTx/>
+                        <a:buSzTx/>
+                        <a:buFont typeface="+mj-lt"/>
+                        <a:buAutoNum type="arabicPeriod"/>
+                        <a:tabLst/>
+                        <a:defRPr/>
+                      </a:pPr>
+                      <a:endParaRPr lang="en-US" altLang="zh-TW" sz="1800" dirty="0" smtClean="0"/>
+                    </a:p>
+                    <a:p>
+                      <a:pPr marL="457200" marR="0" indent="-457200" algn="l" defTabSz="914400" rtl="0" eaLnBrk="1" fontAlgn="auto" latinLnBrk="0" hangingPunct="1">
+                        <a:lnSpc>
+                          <a:spcPct val="100000"/>
+                        </a:lnSpc>
+                        <a:spcBef>
+                          <a:spcPts val="0"/>
+                        </a:spcBef>
+                        <a:spcAft>
+                          <a:spcPts val="0"/>
+                        </a:spcAft>
+                        <a:buClrTx/>
+                        <a:buSzTx/>
+                        <a:buFont typeface="+mj-lt"/>
+                        <a:buAutoNum type="arabicPeriod"/>
+                        <a:tabLst/>
+                        <a:defRPr/>
+                      </a:pPr>
+                      <a:r>
+                        <a:rPr lang="en-US" altLang="zh-TW" sz="1800" dirty="0" smtClean="0"/>
+                        <a:t>Better </a:t>
+                      </a:r>
+                      <a:r>
+                        <a:rPr lang="en-SG" altLang="zh-TW" sz="1800" dirty="0" smtClean="0"/>
+                        <a:t>scalability</a:t>
+                      </a:r>
+                    </a:p>
+                    <a:p>
+                      <a:pPr marL="457200" marR="0" indent="-457200" algn="l" defTabSz="914400" rtl="0" eaLnBrk="1" fontAlgn="auto" latinLnBrk="0" hangingPunct="1">
+                        <a:lnSpc>
+                          <a:spcPct val="100000"/>
+                        </a:lnSpc>
+                        <a:spcBef>
+                          <a:spcPts val="0"/>
+                        </a:spcBef>
+                        <a:spcAft>
+                          <a:spcPts val="0"/>
+                        </a:spcAft>
+                        <a:buClrTx/>
+                        <a:buSzTx/>
+                        <a:buFont typeface="+mj-lt"/>
+                        <a:buAutoNum type="arabicPeriod"/>
+                        <a:tabLst/>
+                        <a:defRPr/>
+                      </a:pPr>
+                      <a:endParaRPr lang="en-SG" altLang="zh-TW" sz="1800" dirty="0" smtClean="0"/>
+                    </a:p>
+                    <a:p>
+                      <a:pPr marL="457200" marR="0" indent="-457200" algn="l" defTabSz="914400" rtl="0" eaLnBrk="1" fontAlgn="auto" latinLnBrk="0" hangingPunct="1">
+                        <a:lnSpc>
+                          <a:spcPct val="100000"/>
+                        </a:lnSpc>
+                        <a:spcBef>
+                          <a:spcPts val="0"/>
+                        </a:spcBef>
+                        <a:spcAft>
+                          <a:spcPts val="0"/>
+                        </a:spcAft>
+                        <a:buClrTx/>
+                        <a:buSzTx/>
+                        <a:buFont typeface="+mj-lt"/>
+                        <a:buAutoNum type="arabicPeriod"/>
+                        <a:tabLst/>
+                        <a:defRPr/>
+                      </a:pPr>
+                      <a:r>
+                        <a:rPr lang="en-SG" altLang="zh-TW" sz="1800" dirty="0" smtClean="0"/>
+                        <a:t>Support dynamic dependency binding</a:t>
+                      </a:r>
+                      <a:endParaRPr lang="zh-TW" altLang="en-US" sz="2000" dirty="0"/>
+                    </a:p>
+                  </a:txBody>
+                  <a:tcPr/>
+                </a:tc>
+                <a:tc>
+                  <a:txBody>
+                    <a:bodyPr/>
+                    <a:lstStyle/>
+                    <a:p>
+                      <a:pPr marL="457200" marR="0" lvl="0" indent="-457200" algn="l" defTabSz="914400" rtl="0" eaLnBrk="1" fontAlgn="auto" latinLnBrk="0" hangingPunct="1">
+                        <a:lnSpc>
+                          <a:spcPct val="100000"/>
+                        </a:lnSpc>
+                        <a:spcBef>
+                          <a:spcPts val="0"/>
+                        </a:spcBef>
+                        <a:spcAft>
+                          <a:spcPts val="0"/>
+                        </a:spcAft>
+                        <a:buClrTx/>
+                        <a:buSzTx/>
+                        <a:buFont typeface="+mj-lt"/>
+                        <a:buAutoNum type="arabicPeriod"/>
+                        <a:tabLst/>
+                        <a:defRPr/>
+                      </a:pPr>
+                      <a:r>
+                        <a:rPr kumimoji="0" lang="en-US" altLang="zh-TW" sz="1800" b="0" i="0" u="none" strike="noStrike" kern="1200" cap="none" spc="0" normalizeH="0" baseline="0" noProof="0" dirty="0" smtClean="0">
+                          <a:ln>
+                            <a:noFill/>
+                          </a:ln>
+                          <a:solidFill>
+                            <a:srgbClr val="2F2F2F"/>
+                          </a:solidFill>
+                          <a:effectLst/>
+                          <a:uLnTx/>
+                          <a:uFillTx/>
+                          <a:latin typeface="+mn-lt"/>
+                          <a:ea typeface="+mn-ea"/>
+                          <a:cs typeface="+mn-cs"/>
+                        </a:rPr>
+                        <a:t>Sub class obtains signature automatically</a:t>
+                      </a:r>
+                    </a:p>
+                    <a:p>
+                      <a:pPr marL="457200" marR="0" lvl="0" indent="-457200" algn="l" defTabSz="914400" rtl="0" eaLnBrk="1" fontAlgn="auto" latinLnBrk="0" hangingPunct="1">
+                        <a:lnSpc>
+                          <a:spcPct val="100000"/>
+                        </a:lnSpc>
+                        <a:spcBef>
+                          <a:spcPts val="0"/>
+                        </a:spcBef>
+                        <a:spcAft>
+                          <a:spcPts val="0"/>
+                        </a:spcAft>
+                        <a:buClrTx/>
+                        <a:buSzTx/>
+                        <a:buFont typeface="+mj-lt"/>
+                        <a:buAutoNum type="arabicPeriod"/>
+                        <a:tabLst/>
+                        <a:defRPr/>
+                      </a:pPr>
+                      <a:endParaRPr kumimoji="0" lang="en-US" altLang="zh-TW" sz="1800" b="0" i="0" u="none" strike="noStrike" kern="1200" cap="none" spc="0" normalizeH="0" baseline="0" noProof="0" dirty="0" smtClean="0">
+                        <a:ln>
+                          <a:noFill/>
+                        </a:ln>
+                        <a:solidFill>
+                          <a:srgbClr val="2F2F2F"/>
+                        </a:solidFill>
+                        <a:effectLst/>
+                        <a:uLnTx/>
+                        <a:uFillTx/>
+                        <a:latin typeface="+mn-lt"/>
+                        <a:ea typeface="+mn-ea"/>
+                        <a:cs typeface="+mn-cs"/>
+                      </a:endParaRPr>
+                    </a:p>
+                    <a:p>
+                      <a:pPr marL="457200" marR="0" lvl="0" indent="-457200" algn="l" defTabSz="914400" rtl="0" eaLnBrk="1" fontAlgn="auto" latinLnBrk="0" hangingPunct="1">
+                        <a:lnSpc>
+                          <a:spcPct val="100000"/>
+                        </a:lnSpc>
+                        <a:spcBef>
+                          <a:spcPts val="0"/>
+                        </a:spcBef>
+                        <a:spcAft>
+                          <a:spcPts val="0"/>
+                        </a:spcAft>
+                        <a:buClrTx/>
+                        <a:buSzTx/>
+                        <a:buFont typeface="+mj-lt"/>
+                        <a:buAutoNum type="arabicPeriod"/>
+                        <a:tabLst/>
+                        <a:defRPr/>
+                      </a:pPr>
+                      <a:r>
+                        <a:rPr kumimoji="0" lang="en-US" altLang="zh-TW" sz="1800" b="0" i="0" u="none" strike="noStrike" kern="1200" cap="none" spc="0" normalizeH="0" baseline="0" noProof="0" dirty="0" smtClean="0">
+                          <a:ln>
+                            <a:noFill/>
+                          </a:ln>
+                          <a:solidFill>
+                            <a:srgbClr val="2F2F2F"/>
+                          </a:solidFill>
+                          <a:effectLst/>
+                          <a:uLnTx/>
+                          <a:uFillTx/>
+                          <a:latin typeface="+mn-lt"/>
+                          <a:ea typeface="+mn-ea"/>
+                          <a:cs typeface="+mn-cs"/>
+                        </a:rPr>
+                        <a:t>Easy to create instances of sub class</a:t>
+                      </a:r>
+                    </a:p>
+                    <a:p>
+                      <a:pPr marL="457200" marR="0" lvl="0" indent="-457200" algn="l" defTabSz="914400" rtl="0" eaLnBrk="1" fontAlgn="auto" latinLnBrk="0" hangingPunct="1">
+                        <a:lnSpc>
+                          <a:spcPct val="100000"/>
+                        </a:lnSpc>
+                        <a:spcBef>
+                          <a:spcPts val="0"/>
+                        </a:spcBef>
+                        <a:spcAft>
+                          <a:spcPts val="0"/>
+                        </a:spcAft>
+                        <a:buClrTx/>
+                        <a:buSzTx/>
+                        <a:buFont typeface="+mj-lt"/>
+                        <a:buAutoNum type="arabicPeriod"/>
+                        <a:tabLst/>
+                        <a:defRPr/>
+                      </a:pPr>
+                      <a:endParaRPr kumimoji="0" lang="en-US" altLang="zh-TW" sz="1800" b="0" i="0" u="none" strike="noStrike" kern="1200" cap="none" spc="0" normalizeH="0" baseline="0" noProof="0" dirty="0" smtClean="0">
+                        <a:ln>
+                          <a:noFill/>
+                        </a:ln>
+                        <a:solidFill>
+                          <a:srgbClr val="2F2F2F"/>
+                        </a:solidFill>
+                        <a:effectLst/>
+                        <a:uLnTx/>
+                        <a:uFillTx/>
+                        <a:latin typeface="+mn-lt"/>
+                        <a:ea typeface="+mn-ea"/>
+                        <a:cs typeface="+mn-cs"/>
+                      </a:endParaRPr>
+                    </a:p>
+                    <a:p>
+                      <a:endParaRPr lang="zh-TW" altLang="en-US" sz="2000" dirty="0"/>
+                    </a:p>
+                  </a:txBody>
+                  <a:tcPr/>
+                </a:tc>
+              </a:tr>
+              <a:tr h="1939783">
+                <a:tc>
+                  <a:txBody>
+                    <a:bodyPr/>
+                    <a:lstStyle/>
+                    <a:p>
+                      <a:r>
+                        <a:rPr lang="en-US" altLang="zh-TW" sz="2800" dirty="0" smtClean="0"/>
+                        <a:t>Cons</a:t>
+                      </a:r>
+                      <a:endParaRPr lang="zh-TW" altLang="en-US" sz="2800" dirty="0"/>
+                    </a:p>
+                  </a:txBody>
+                  <a:tcPr/>
+                </a:tc>
+                <a:tc>
+                  <a:txBody>
+                    <a:bodyPr/>
+                    <a:lstStyle/>
+                    <a:p>
+                      <a:pPr marL="457200" marR="0" lvl="0" indent="-457200" algn="l" defTabSz="914400" rtl="0" eaLnBrk="1" fontAlgn="auto" latinLnBrk="0" hangingPunct="1">
+                        <a:lnSpc>
+                          <a:spcPct val="100000"/>
+                        </a:lnSpc>
+                        <a:spcBef>
+                          <a:spcPts val="0"/>
+                        </a:spcBef>
+                        <a:spcAft>
+                          <a:spcPts val="0"/>
+                        </a:spcAft>
+                        <a:buClrTx/>
+                        <a:buSzTx/>
+                        <a:buFont typeface="+mj-lt"/>
+                        <a:buAutoNum type="arabicPeriod"/>
+                        <a:tabLst/>
+                        <a:defRPr/>
+                      </a:pPr>
+                      <a:r>
+                        <a:rPr kumimoji="0" lang="en-US" altLang="zh-TW" sz="1800" b="0" i="0" u="none" strike="noStrike" kern="1200" cap="none" spc="0" normalizeH="0" baseline="0" noProof="0" dirty="0" smtClean="0">
+                          <a:ln>
+                            <a:noFill/>
+                          </a:ln>
+                          <a:solidFill>
+                            <a:srgbClr val="2F2F2F"/>
+                          </a:solidFill>
+                          <a:effectLst/>
+                          <a:uLnTx/>
+                          <a:uFillTx/>
+                          <a:latin typeface="+mn-lt"/>
+                          <a:ea typeface="+mn-ea"/>
+                          <a:cs typeface="+mn-cs"/>
+                        </a:rPr>
+                        <a:t>Cannot obtain signature automatically</a:t>
+                      </a:r>
+                    </a:p>
+                    <a:p>
+                      <a:pPr marL="457200" marR="0" lvl="0" indent="-457200" algn="l" defTabSz="914400" rtl="0" eaLnBrk="1" fontAlgn="auto" latinLnBrk="0" hangingPunct="1">
+                        <a:lnSpc>
+                          <a:spcPct val="100000"/>
+                        </a:lnSpc>
+                        <a:spcBef>
+                          <a:spcPts val="0"/>
+                        </a:spcBef>
+                        <a:spcAft>
+                          <a:spcPts val="0"/>
+                        </a:spcAft>
+                        <a:buClrTx/>
+                        <a:buSzTx/>
+                        <a:buFont typeface="+mj-lt"/>
+                        <a:buAutoNum type="arabicPeriod"/>
+                        <a:tabLst/>
+                        <a:defRPr/>
+                      </a:pPr>
+                      <a:endParaRPr kumimoji="0" lang="en-US" altLang="zh-TW" sz="1800" b="0" i="0" u="none" strike="noStrike" kern="1200" cap="none" spc="0" normalizeH="0" baseline="0" noProof="0" dirty="0" smtClean="0">
+                        <a:ln>
+                          <a:noFill/>
+                        </a:ln>
+                        <a:solidFill>
+                          <a:srgbClr val="2F2F2F"/>
+                        </a:solidFill>
+                        <a:effectLst/>
+                        <a:uLnTx/>
+                        <a:uFillTx/>
+                        <a:latin typeface="+mn-lt"/>
+                        <a:ea typeface="+mn-ea"/>
+                        <a:cs typeface="+mn-cs"/>
+                      </a:endParaRPr>
+                    </a:p>
+                    <a:p>
+                      <a:pPr marL="457200" marR="0" lvl="0" indent="-457200" algn="l" defTabSz="914400" rtl="0" eaLnBrk="1" fontAlgn="auto" latinLnBrk="0" hangingPunct="1">
+                        <a:lnSpc>
+                          <a:spcPct val="100000"/>
+                        </a:lnSpc>
+                        <a:spcBef>
+                          <a:spcPts val="0"/>
+                        </a:spcBef>
+                        <a:spcAft>
+                          <a:spcPts val="0"/>
+                        </a:spcAft>
+                        <a:buClrTx/>
+                        <a:buSzTx/>
+                        <a:buFont typeface="+mj-lt"/>
+                        <a:buAutoNum type="arabicPeriod"/>
+                        <a:tabLst/>
+                        <a:defRPr/>
+                      </a:pPr>
+                      <a:r>
+                        <a:rPr kumimoji="0" lang="en-US" altLang="zh-TW" sz="1800" b="0" i="0" u="none" strike="noStrike" kern="1200" cap="none" spc="0" normalizeH="0" baseline="0" noProof="0" dirty="0" smtClean="0">
+                          <a:ln>
+                            <a:noFill/>
+                          </a:ln>
+                          <a:solidFill>
+                            <a:srgbClr val="2F2F2F"/>
+                          </a:solidFill>
+                          <a:effectLst/>
+                          <a:uLnTx/>
+                          <a:uFillTx/>
+                          <a:latin typeface="+mn-lt"/>
+                          <a:ea typeface="+mn-ea"/>
+                          <a:cs typeface="+mn-cs"/>
+                        </a:rPr>
+                        <a:t>Need to create sets of instances</a:t>
+                      </a:r>
+                    </a:p>
+                    <a:p>
+                      <a:endParaRPr lang="zh-TW" altLang="en-US" sz="2000" dirty="0"/>
+                    </a:p>
+                  </a:txBody>
+                  <a:tcPr/>
+                </a:tc>
+                <a:tc>
+                  <a:txBody>
+                    <a:bodyPr/>
+                    <a:lstStyle/>
+                    <a:p>
+                      <a:pPr marL="457200" marR="0" indent="-457200" algn="l" defTabSz="914400" rtl="0" eaLnBrk="1" fontAlgn="auto" latinLnBrk="0" hangingPunct="1">
+                        <a:lnSpc>
+                          <a:spcPct val="100000"/>
+                        </a:lnSpc>
+                        <a:spcBef>
+                          <a:spcPts val="0"/>
+                        </a:spcBef>
+                        <a:spcAft>
+                          <a:spcPts val="0"/>
+                        </a:spcAft>
+                        <a:buClrTx/>
+                        <a:buSzTx/>
+                        <a:buFont typeface="+mj-lt"/>
+                        <a:buAutoNum type="arabicPeriod"/>
+                        <a:tabLst/>
+                        <a:defRPr/>
+                      </a:pPr>
+                      <a:r>
+                        <a:rPr lang="en-US" altLang="zh-TW" sz="1800" dirty="0" smtClean="0"/>
+                        <a:t>Breaks encapsulation</a:t>
+                      </a:r>
+                    </a:p>
+                    <a:p>
+                      <a:pPr marL="457200" marR="0" indent="-457200" algn="l" defTabSz="914400" rtl="0" eaLnBrk="1" fontAlgn="auto" latinLnBrk="0" hangingPunct="1">
+                        <a:lnSpc>
+                          <a:spcPct val="100000"/>
+                        </a:lnSpc>
+                        <a:spcBef>
+                          <a:spcPts val="0"/>
+                        </a:spcBef>
+                        <a:spcAft>
+                          <a:spcPts val="0"/>
+                        </a:spcAft>
+                        <a:buClrTx/>
+                        <a:buSzTx/>
+                        <a:buFont typeface="+mj-lt"/>
+                        <a:buAutoNum type="arabicPeriod"/>
+                        <a:tabLst/>
+                        <a:defRPr/>
+                      </a:pPr>
+                      <a:endParaRPr lang="en-US" altLang="zh-TW" sz="1800" dirty="0" smtClean="0"/>
+                    </a:p>
+                    <a:p>
+                      <a:pPr marL="457200" marR="0" indent="-457200" algn="l" defTabSz="914400" rtl="0" eaLnBrk="1" fontAlgn="auto" latinLnBrk="0" hangingPunct="1">
+                        <a:lnSpc>
+                          <a:spcPct val="100000"/>
+                        </a:lnSpc>
+                        <a:spcBef>
+                          <a:spcPts val="0"/>
+                        </a:spcBef>
+                        <a:spcAft>
+                          <a:spcPts val="0"/>
+                        </a:spcAft>
+                        <a:buClrTx/>
+                        <a:buSzTx/>
+                        <a:buFont typeface="+mj-lt"/>
+                        <a:buAutoNum type="arabicPeriod"/>
+                        <a:tabLst/>
+                        <a:defRPr/>
+                      </a:pPr>
+                      <a:r>
+                        <a:rPr lang="en-US" altLang="zh-TW" sz="1800" dirty="0" smtClean="0"/>
+                        <a:t>High coupling</a:t>
+                      </a:r>
+                    </a:p>
+                    <a:p>
+                      <a:pPr marL="457200" marR="0" indent="-457200" algn="l" defTabSz="914400" rtl="0" eaLnBrk="1" fontAlgn="auto" latinLnBrk="0" hangingPunct="1">
+                        <a:lnSpc>
+                          <a:spcPct val="100000"/>
+                        </a:lnSpc>
+                        <a:spcBef>
+                          <a:spcPts val="0"/>
+                        </a:spcBef>
+                        <a:spcAft>
+                          <a:spcPts val="0"/>
+                        </a:spcAft>
+                        <a:buClrTx/>
+                        <a:buSzTx/>
+                        <a:buFont typeface="+mj-lt"/>
+                        <a:buAutoNum type="arabicPeriod"/>
+                        <a:tabLst/>
+                        <a:defRPr/>
+                      </a:pPr>
+                      <a:endParaRPr lang="en-US" altLang="zh-TW" sz="1800" dirty="0" smtClean="0"/>
+                    </a:p>
+                    <a:p>
+                      <a:pPr marL="457200" marR="0" indent="-457200" algn="l" defTabSz="914400" rtl="0" eaLnBrk="1" fontAlgn="auto" latinLnBrk="0" hangingPunct="1">
+                        <a:lnSpc>
+                          <a:spcPct val="100000"/>
+                        </a:lnSpc>
+                        <a:spcBef>
+                          <a:spcPts val="0"/>
+                        </a:spcBef>
+                        <a:spcAft>
+                          <a:spcPts val="0"/>
+                        </a:spcAft>
+                        <a:buClrTx/>
+                        <a:buSzTx/>
+                        <a:buFont typeface="+mj-lt"/>
+                        <a:buAutoNum type="arabicPeriod"/>
+                        <a:tabLst/>
+                        <a:defRPr/>
+                      </a:pPr>
+                      <a:r>
+                        <a:rPr lang="en-US" altLang="zh-TW" sz="1800" dirty="0" smtClean="0"/>
+                        <a:t>Hard to control relationships and complexity</a:t>
+                      </a:r>
+                      <a:endParaRPr lang="zh-TW" altLang="en-US" sz="1800" dirty="0" smtClean="0"/>
+                    </a:p>
+                    <a:p>
+                      <a:endParaRPr lang="zh-TW" altLang="en-US" sz="2000" dirty="0"/>
+                    </a:p>
+                  </a:txBody>
+                  <a:tcPr/>
+                </a:tc>
+              </a:tr>
+            </a:tbl>
+          </a:graphicData>
+        </a:graphic>
+      </p:graphicFrame>
     </p:spTree>
     <p:extLst>
       <p:ext uri="{BB962C8B-B14F-4D97-AF65-F5344CB8AC3E}">
-        <p14:creationId xmlns:p14="http://schemas.microsoft.com/office/powerpoint/2010/main" val="839297585"/>
+        <p14:creationId xmlns:p14="http://schemas.microsoft.com/office/powerpoint/2010/main" val="1361196820"/>
       </p:ext>
     </p:extLst>
   </p:cSld>
@@ -4299,7 +4956,7 @@
           <a:p>
             <a:r>
               <a:rPr lang="en-US" dirty="0" smtClean="0"/>
-              <a:t>Q&amp;A</a:t>
+              <a:t>Trade-Off</a:t>
             </a:r>
             <a:endParaRPr lang="en-SG" dirty="0"/>
           </a:p>
@@ -4320,11 +4977,46 @@
           <a:bodyPr/>
           <a:lstStyle/>
           <a:p>
-            <a:endParaRPr lang="en-SG"/>
+            <a:r>
+              <a:rPr lang="en-SG" dirty="0" smtClean="0"/>
+              <a:t>Reusability</a:t>
+            </a:r>
+            <a:endParaRPr lang="en-SG" dirty="0"/>
+          </a:p>
+          <a:p>
+            <a:r>
+              <a:rPr lang="en-SG" dirty="0" smtClean="0"/>
+              <a:t>Scalability</a:t>
+            </a:r>
+          </a:p>
+          <a:p>
+            <a:r>
+              <a:rPr lang="en-SG" dirty="0" smtClean="0"/>
+              <a:t>Readability</a:t>
+            </a:r>
+            <a:endParaRPr lang="en-SG" dirty="0"/>
+          </a:p>
+          <a:p>
+            <a:r>
+              <a:rPr lang="en-SG" dirty="0" smtClean="0"/>
+              <a:t>Testability</a:t>
+            </a:r>
+          </a:p>
+          <a:p>
+            <a:r>
+              <a:rPr lang="en-SG" altLang="zh-TW" dirty="0"/>
+              <a:t>Performance</a:t>
+            </a:r>
+            <a:endParaRPr lang="en-SG" dirty="0"/>
           </a:p>
         </p:txBody>
       </p:sp>
     </p:spTree>
+    <p:extLst>
+      <p:ext uri="{BB962C8B-B14F-4D97-AF65-F5344CB8AC3E}">
+        <p14:creationId xmlns:p14="http://schemas.microsoft.com/office/powerpoint/2010/main" val="839297585"/>
+      </p:ext>
+    </p:extLst>
   </p:cSld>
   <p:clrMapOvr>
     <a:masterClrMapping/>
@@ -4406,6 +5098,10 @@
               <a:rPr lang="en-US" dirty="0" err="1" smtClean="0"/>
               <a:t>IoC</a:t>
             </a:r>
+            <a:r>
+              <a:rPr lang="en-US" dirty="0"/>
+              <a:t> - Inversion of Control</a:t>
+            </a:r>
             <a:endParaRPr lang="en-US" dirty="0" smtClean="0"/>
           </a:p>
           <a:p>
@@ -4503,6 +5199,80 @@
           <a:lstStyle/>
           <a:p>
             <a:endParaRPr lang="en-US"/>
+          </a:p>
+        </p:txBody>
+      </p:sp>
+    </p:spTree>
+  </p:cSld>
+  <p:clrMapOvr>
+    <a:masterClrMapping/>
+  </p:clrMapOvr>
+  <p:timing>
+    <p:tnLst>
+      <p:par>
+        <p:cTn id="1" dur="indefinite" restart="never" nodeType="tmRoot"/>
+      </p:par>
+    </p:tnLst>
+  </p:timing>
+</p:sld>
+</file>
+
+<file path=ppt/slides/slide20.xml><?xml version="1.0" encoding="utf-8"?>
+<p:sld xmlns:a="http://schemas.openxmlformats.org/drawingml/2006/main" xmlns:r="http://schemas.openxmlformats.org/officeDocument/2006/relationships" xmlns:p="http://schemas.openxmlformats.org/presentationml/2006/main">
+  <p:cSld>
+    <p:spTree>
+      <p:nvGrpSpPr>
+        <p:cNvPr id="1" name=""/>
+        <p:cNvGrpSpPr/>
+        <p:nvPr/>
+      </p:nvGrpSpPr>
+      <p:grpSpPr>
+        <a:xfrm>
+          <a:off x="0" y="0"/>
+          <a:ext cx="0" cy="0"/>
+          <a:chOff x="0" y="0"/>
+          <a:chExt cx="0" cy="0"/>
+        </a:xfrm>
+      </p:grpSpPr>
+      <p:sp>
+        <p:nvSpPr>
+          <p:cNvPr id="3" name="Title 2"/>
+          <p:cNvSpPr>
+            <a:spLocks noGrp="1"/>
+          </p:cNvSpPr>
+          <p:nvPr>
+            <p:ph type="title"/>
+          </p:nvPr>
+        </p:nvSpPr>
+        <p:spPr/>
+        <p:txBody>
+          <a:bodyPr/>
+          <a:lstStyle/>
+          <a:p>
+            <a:r>
+              <a:rPr lang="en-US" dirty="0" smtClean="0"/>
+              <a:t>Q&amp;A</a:t>
+            </a:r>
+            <a:endParaRPr lang="en-SG" dirty="0"/>
+          </a:p>
+        </p:txBody>
+      </p:sp>
+      <p:sp>
+        <p:nvSpPr>
+          <p:cNvPr id="2" name="Content Placeholder 1"/>
+          <p:cNvSpPr>
+            <a:spLocks noGrp="1"/>
+          </p:cNvSpPr>
+          <p:nvPr>
+            <p:ph idx="1"/>
+          </p:nvPr>
+        </p:nvSpPr>
+        <p:spPr/>
+        <p:txBody>
+          <a:bodyPr/>
+          <a:lstStyle/>
+          <a:p>
+            <a:endParaRPr lang="en-SG"/>
           </a:p>
         </p:txBody>
       </p:sp>

</xml_diff>

<commit_message>
update comments and ppt
</commit_message>
<xml_diff>
--- a/OOP_Brett.pptx
+++ b/OOP_Brett.pptx
@@ -129,6 +129,36 @@
       </a:defRPr>
     </a:lvl9pPr>
   </p:defaultTextStyle>
+  <p:extLst>
+    <p:ext uri="{EFAFB233-063F-42B5-8137-9DF3F51BA10A}">
+      <p15:sldGuideLst xmlns:p15="http://schemas.microsoft.com/office/powerpoint/2012/main">
+        <p15:guide id="1" orient="horz" pos="2160">
+          <p15:clr>
+            <a:srgbClr val="A4A3A4"/>
+          </p15:clr>
+        </p15:guide>
+        <p15:guide id="2" pos="2880">
+          <p15:clr>
+            <a:srgbClr val="A4A3A4"/>
+          </p15:clr>
+        </p15:guide>
+      </p15:sldGuideLst>
+    </p:ext>
+    <p:ext uri="{2D200454-40CA-4A62-9FC3-DE9A4176ACB9}">
+      <p15:notesGuideLst xmlns:p15="http://schemas.microsoft.com/office/powerpoint/2012/main">
+        <p15:guide id="1" orient="horz" pos="2931">
+          <p15:clr>
+            <a:srgbClr val="A4A3A4"/>
+          </p15:clr>
+        </p15:guide>
+        <p15:guide id="2" pos="2211">
+          <p15:clr>
+            <a:srgbClr val="A4A3A4"/>
+          </p15:clr>
+        </p15:guide>
+      </p15:notesGuideLst>
+    </p:ext>
+  </p:extLst>
 </p:presentation>
 </file>
 
@@ -215,7 +245,7 @@
             <a:fld id="{4B961133-B6D3-4465-A6C8-3D8BB1E86C16}" type="datetimeFigureOut">
               <a:rPr lang="en-SG" smtClean="0"/>
               <a:pPr/>
-              <a:t>3/7/2017</a:t>
+              <a:t>6/7/2017</a:t>
             </a:fld>
             <a:endParaRPr lang="en-SG"/>
           </a:p>
@@ -382,7 +412,7 @@
             <a:fld id="{9416A1FE-C69D-4CB0-9DE4-FC2FDBD41C6E}" type="datetimeFigureOut">
               <a:rPr lang="en-SG" smtClean="0"/>
               <a:pPr/>
-              <a:t>3/7/2017</a:t>
+              <a:t>6/7/2017</a:t>
             </a:fld>
             <a:endParaRPr lang="en-SG"/>
           </a:p>
@@ -728,6 +758,11 @@
         </p:txBody>
       </p:sp>
     </p:spTree>
+    <p:extLst>
+      <p:ext uri="{BB962C8B-B14F-4D97-AF65-F5344CB8AC3E}">
+        <p14:creationId xmlns:p14="http://schemas.microsoft.com/office/powerpoint/2010/main" val="1226800365"/>
+      </p:ext>
+    </p:extLst>
   </p:cSld>
   <p:clrMapOvr>
     <a:masterClrMapping/>
@@ -810,6 +845,11 @@
         </p:txBody>
       </p:sp>
     </p:spTree>
+    <p:extLst>
+      <p:ext uri="{BB962C8B-B14F-4D97-AF65-F5344CB8AC3E}">
+        <p14:creationId xmlns:p14="http://schemas.microsoft.com/office/powerpoint/2010/main" val="3111396535"/>
+      </p:ext>
+    </p:extLst>
   </p:cSld>
   <p:clrMapOvr>
     <a:masterClrMapping/>
@@ -892,6 +932,11 @@
         </p:txBody>
       </p:sp>
     </p:spTree>
+    <p:extLst>
+      <p:ext uri="{BB962C8B-B14F-4D97-AF65-F5344CB8AC3E}">
+        <p14:creationId xmlns:p14="http://schemas.microsoft.com/office/powerpoint/2010/main" val="3888463614"/>
+      </p:ext>
+    </p:extLst>
   </p:cSld>
   <p:clrMapOvr>
     <a:masterClrMapping/>
@@ -974,6 +1019,11 @@
         </p:txBody>
       </p:sp>
     </p:spTree>
+    <p:extLst>
+      <p:ext uri="{BB962C8B-B14F-4D97-AF65-F5344CB8AC3E}">
+        <p14:creationId xmlns:p14="http://schemas.microsoft.com/office/powerpoint/2010/main" val="2256821219"/>
+      </p:ext>
+    </p:extLst>
   </p:cSld>
   <p:clrMapOvr>
     <a:masterClrMapping/>
@@ -1404,7 +1454,7 @@
                 <a:tabLst/>
                 <a:defRPr/>
               </a:pPr>
-              <a:t>3 July 2017</a:t>
+              <a:t>6 July 2017</a:t>
             </a:fld>
             <a:endParaRPr kumimoji="0" lang="zh-TW" altLang="en-US" sz="1400" b="0" i="0" u="none" strike="noStrike" kern="1200" cap="none" spc="170" normalizeH="0" baseline="0" noProof="0" dirty="0">
               <a:ln>
@@ -3954,11 +4004,7 @@
           <a:p>
             <a:r>
               <a:rPr lang="en-US" altLang="zh-TW" dirty="0" smtClean="0"/>
-              <a:t>Dependency </a:t>
-            </a:r>
-            <a:r>
-              <a:rPr lang="en-US" altLang="zh-TW" dirty="0" smtClean="0"/>
-              <a:t>Injection</a:t>
+              <a:t>Dependency Injection</a:t>
             </a:r>
           </a:p>
           <a:p>
@@ -3982,18 +4028,22 @@
           <a:p>
             <a:r>
               <a:rPr lang="en-US" altLang="zh-TW" dirty="0" smtClean="0"/>
-              <a:t>Pros </a:t>
-            </a:r>
-            <a:r>
-              <a:rPr lang="en-US" altLang="zh-TW" dirty="0" smtClean="0"/>
-              <a:t>and Cons</a:t>
+              <a:t>Pros and Cons</a:t>
             </a:r>
           </a:p>
           <a:p>
             <a:pPr lvl="1"/>
             <a:r>
               <a:rPr lang="en-US" altLang="zh-TW" dirty="0"/>
-              <a:t>How to ensure dependencies were injected?</a:t>
+              <a:t>How to ensure dependencies </a:t>
+            </a:r>
+            <a:r>
+              <a:rPr lang="en-US" altLang="zh-TW" dirty="0" smtClean="0"/>
+              <a:t>are injected</a:t>
+            </a:r>
+            <a:r>
+              <a:rPr lang="en-US" altLang="zh-TW" dirty="0"/>
+              <a:t>?</a:t>
             </a:r>
           </a:p>
           <a:p>
@@ -4103,11 +4153,7 @@
             <a:pPr lvl="1"/>
             <a:r>
               <a:rPr lang="en-US" altLang="zh-TW" dirty="0" smtClean="0"/>
-              <a:t>A has a </a:t>
-            </a:r>
-            <a:r>
-              <a:rPr lang="en-US" altLang="zh-TW" dirty="0" smtClean="0"/>
-              <a:t>B</a:t>
+              <a:t>A has a B</a:t>
             </a:r>
           </a:p>
           <a:p>
@@ -4131,11 +4177,7 @@
             <a:pPr lvl="1"/>
             <a:r>
               <a:rPr lang="en-US" altLang="zh-TW" dirty="0" smtClean="0"/>
-              <a:t>A contains a B (same life circle</a:t>
-            </a:r>
-            <a:r>
-              <a:rPr lang="en-US" altLang="zh-TW" dirty="0" smtClean="0"/>
-              <a:t>)</a:t>
+              <a:t>A contains a B (same life circle)</a:t>
             </a:r>
           </a:p>
           <a:p>
@@ -4160,11 +4202,7 @@
             <a:pPr lvl="1"/>
             <a:r>
               <a:rPr lang="en-US" altLang="zh-TW" dirty="0" smtClean="0"/>
-              <a:t>A is a </a:t>
-            </a:r>
-            <a:r>
-              <a:rPr lang="en-US" altLang="zh-TW" dirty="0" smtClean="0"/>
-              <a:t>B</a:t>
+              <a:t>A is a B</a:t>
             </a:r>
           </a:p>
           <a:p>
@@ -4173,7 +4211,6 @@
               <a:rPr lang="en-US" altLang="zh-TW" dirty="0" smtClean="0"/>
               <a:t>Monkey is an animal</a:t>
             </a:r>
-            <a:endParaRPr lang="en-US" altLang="zh-TW" dirty="0" smtClean="0"/>
           </a:p>
           <a:p>
             <a:pPr lvl="1"/>
@@ -4259,14 +4296,14 @@
             <p:ph idx="1"/>
             <p:extLst>
               <p:ext uri="{D42A27DB-BD31-4B8C-83A1-F6EECF244321}">
-                <p14:modId xmlns:p14="http://schemas.microsoft.com/office/powerpoint/2010/main" val="173311692"/>
+                <p14:modId xmlns:p14="http://schemas.microsoft.com/office/powerpoint/2010/main" val="214592728"/>
               </p:ext>
             </p:extLst>
           </p:nvPr>
         </p:nvGraphicFramePr>
         <p:xfrm>
-          <a:off x="395289" y="1557338"/>
-          <a:ext cx="7921127" cy="4984552"/>
+          <a:off x="395536" y="1412776"/>
+          <a:ext cx="7921127" cy="5186975"/>
         </p:xfrm>
         <a:graphic>
           <a:graphicData uri="http://schemas.openxmlformats.org/drawingml/2006/table">
@@ -4326,10 +4363,10 @@
                     <a:lstStyle/>
                     <a:p>
                       <a:r>
-                        <a:rPr lang="en-US" altLang="zh-TW" sz="2800" dirty="0" smtClean="0"/>
+                        <a:rPr lang="en-US" altLang="zh-TW" sz="2700" dirty="0" smtClean="0"/>
                         <a:t>Pros</a:t>
                       </a:r>
-                      <a:endParaRPr lang="zh-TW" altLang="en-US" sz="2800" dirty="0"/>
+                      <a:endParaRPr lang="zh-TW" altLang="en-US" sz="2700" dirty="0"/>
                     </a:p>
                   </a:txBody>
                   <a:tcPr/>
@@ -4491,8 +4528,31 @@
                       </a:pPr>
                       <a:r>
                         <a:rPr lang="en-SG" altLang="zh-TW" sz="1800" dirty="0" smtClean="0"/>
-                        <a:t>Support dynamic dependency binding</a:t>
+                        <a:t>Support dynamic dependency </a:t>
                       </a:r>
+                      <a:r>
+                        <a:rPr lang="en-SG" altLang="zh-TW" sz="1800" dirty="0" smtClean="0"/>
+                        <a:t>binding</a:t>
+                      </a:r>
+                    </a:p>
+                    <a:p>
+                      <a:pPr marL="457200" marR="0" indent="-457200" algn="l" defTabSz="914400" rtl="0" eaLnBrk="1" fontAlgn="auto" latinLnBrk="0" hangingPunct="1">
+                        <a:lnSpc>
+                          <a:spcPct val="100000"/>
+                        </a:lnSpc>
+                        <a:spcBef>
+                          <a:spcPts val="0"/>
+                        </a:spcBef>
+                        <a:spcAft>
+                          <a:spcPts val="0"/>
+                        </a:spcAft>
+                        <a:buClrTx/>
+                        <a:buSzTx/>
+                        <a:buFont typeface="+mj-lt"/>
+                        <a:buAutoNum type="arabicPeriod"/>
+                        <a:tabLst/>
+                        <a:defRPr/>
+                      </a:pPr>
                       <a:endParaRPr lang="zh-TW" altLang="en-US" sz="2000" dirty="0"/>
                     </a:p>
                   </a:txBody>
@@ -4654,10 +4714,10 @@
                     <a:lstStyle/>
                     <a:p>
                       <a:r>
-                        <a:rPr lang="en-US" altLang="zh-TW" sz="2800" dirty="0" smtClean="0"/>
+                        <a:rPr lang="en-US" altLang="zh-TW" sz="2700" dirty="0" smtClean="0"/>
                         <a:t>Cons</a:t>
                       </a:r>
-                      <a:endParaRPr lang="zh-TW" altLang="en-US" sz="2800" dirty="0"/>
+                      <a:endParaRPr lang="zh-TW" altLang="en-US" sz="2700" dirty="0"/>
                     </a:p>
                   </a:txBody>
                   <a:tcPr/>
@@ -4768,8 +4828,39 @@
                           <a:ea typeface="+mn-ea"/>
                           <a:cs typeface="+mn-cs"/>
                         </a:rPr>
-                        <a:t>Need to create sets of instances</a:t>
+                        <a:t>Need to create sets of </a:t>
                       </a:r>
+                      <a:r>
+                        <a:rPr kumimoji="0" lang="en-US" altLang="zh-TW" sz="1800" b="0" i="0" u="none" strike="noStrike" kern="1200" cap="none" spc="0" normalizeH="0" baseline="0" noProof="0" dirty="0" smtClean="0">
+                          <a:ln>
+                            <a:noFill/>
+                          </a:ln>
+                          <a:solidFill>
+                            <a:srgbClr val="2F2F2F"/>
+                          </a:solidFill>
+                          <a:effectLst/>
+                          <a:uLnTx/>
+                          <a:uFillTx/>
+                          <a:latin typeface="+mn-lt"/>
+                          <a:ea typeface="+mn-ea"/>
+                          <a:cs typeface="+mn-cs"/>
+                        </a:rPr>
+                        <a:t>instances of interface</a:t>
+                      </a:r>
+                      <a:endParaRPr kumimoji="0" lang="en-US" altLang="zh-TW" sz="1800" b="0" i="0" u="none" strike="noStrike" kern="1200" cap="none" spc="0" normalizeH="0" baseline="0" noProof="0" dirty="0" smtClean="0">
+                        <a:ln>
+                          <a:noFill/>
+                        </a:ln>
+                        <a:solidFill>
+                          <a:srgbClr val="2F2F2F"/>
+                        </a:solidFill>
+                        <a:effectLst/>
+                        <a:uLnTx/>
+                        <a:uFillTx/>
+                        <a:latin typeface="+mn-lt"/>
+                        <a:ea typeface="+mn-ea"/>
+                        <a:cs typeface="+mn-cs"/>
+                      </a:endParaRPr>
                     </a:p>
                     <a:p>
                       <a:endParaRPr lang="zh-TW" altLang="en-US" sz="2000" dirty="0"/>
@@ -4887,11 +4978,12 @@
                       </a:pPr>
                       <a:r>
                         <a:rPr lang="en-US" altLang="zh-TW" sz="1800" dirty="0" smtClean="0"/>
-                        <a:t>Hard to control relationships and complexity</a:t>
+                        <a:t>Hard to control relationships and </a:t>
                       </a:r>
-                      <a:endParaRPr lang="zh-TW" altLang="en-US" sz="1800" dirty="0" smtClean="0"/>
-                    </a:p>
-                    <a:p>
+                      <a:r>
+                        <a:rPr lang="en-US" altLang="zh-TW" sz="1800" dirty="0" smtClean="0"/>
+                        <a:t>complexity</a:t>
+                      </a:r>
                       <a:endParaRPr lang="zh-TW" altLang="en-US" sz="2000" dirty="0"/>
                     </a:p>
                   </a:txBody>

</xml_diff>